<commit_message>
update to code so months are characters
</commit_message>
<xml_diff>
--- a/presentation/Rtidyversetutorial.pptx
+++ b/presentation/Rtidyversetutorial.pptx
@@ -2995,7 +2995,7 @@
       </p:sp>
       <p:pic>
         <p:nvPicPr>
-          <p:cNvPr id="5" name="Picture 4"/>
+          <p:cNvPr id="4" name="Picture 3"/>
           <p:cNvPicPr>
             <a:picLocks noChangeAspect="1"/>
           </p:cNvPicPr>
@@ -3009,8 +3009,8 @@
         </p:blipFill>
         <p:spPr>
           <a:xfrm>
-            <a:off x="1489166" y="1659899"/>
-            <a:ext cx="6275912" cy="3019425"/>
+            <a:off x="1409286" y="1289326"/>
+            <a:ext cx="6949376" cy="3223665"/>
           </a:xfrm>
           <a:prstGeom prst="rect">
             <a:avLst/>
@@ -3708,11 +3708,7 @@
           <a:p>
             <a:r>
               <a:rPr lang="en-US" dirty="0" smtClean="0"/>
-              <a:t>Processing </a:t>
-            </a:r>
-            <a:r>
-              <a:rPr lang="en-US" dirty="0" smtClean="0"/>
-              <a:t>data</a:t>
+              <a:t>Processing data</a:t>
             </a:r>
           </a:p>
           <a:p>
@@ -3724,7 +3720,6 @@
               <a:rPr lang="en-US" dirty="0" smtClean="0"/>
               <a:t> data</a:t>
             </a:r>
-            <a:endParaRPr lang="en-US" dirty="0" smtClean="0"/>
           </a:p>
           <a:p>
             <a:endParaRPr lang="en-US" dirty="0"/>
@@ -3902,11 +3897,7 @@
             </a:r>
             <a:r>
               <a:rPr lang="en-US" dirty="0" smtClean="0"/>
-              <a:t>functions </a:t>
-            </a:r>
-            <a:r>
-              <a:rPr lang="en-US" dirty="0" smtClean="0"/>
-              <a:t>and understand output</a:t>
+              <a:t>functions and understand output</a:t>
             </a:r>
             <a:endParaRPr lang="en-US" dirty="0"/>
           </a:p>
@@ -4044,7 +4035,6 @@
               <a:rPr lang="en-US" dirty="0" smtClean="0"/>
               <a:t>-&gt; </a:t>
             </a:r>
-            <a:endParaRPr lang="en-US" dirty="0" smtClean="0"/>
           </a:p>
           <a:p>
             <a:endParaRPr lang="en-GB" dirty="0" smtClean="0"/>
@@ -4440,11 +4430,7 @@
             </a:r>
             <a:r>
               <a:rPr lang="en-US" dirty="0" smtClean="0"/>
-              <a:t>cell (i.e. </a:t>
-            </a:r>
-            <a:r>
-              <a:rPr lang="en-US" dirty="0" smtClean="0"/>
-              <a:t>it is tidy)</a:t>
+              <a:t>cell (i.e. it is tidy)</a:t>
             </a:r>
             <a:endParaRPr lang="en-US" kern="0" dirty="0" smtClean="0"/>
           </a:p>
@@ -4926,19 +4912,7 @@
             <a:pPr defTabSz="914400"/>
             <a:r>
               <a:rPr lang="en-US" kern="0" dirty="0" smtClean="0"/>
-              <a:t>&lt;- </a:t>
-            </a:r>
-            <a:r>
-              <a:rPr lang="en-US" kern="0" dirty="0" smtClean="0"/>
-              <a:t>is the assignment </a:t>
-            </a:r>
-            <a:r>
-              <a:rPr lang="en-US" kern="0" dirty="0" smtClean="0"/>
-              <a:t>operator, it creates a new object </a:t>
-            </a:r>
-            <a:r>
-              <a:rPr lang="en-US" kern="0" dirty="0" smtClean="0"/>
-              <a:t>(check your workspace!)</a:t>
+              <a:t>&lt;- is the assignment operator, it creates a new object (check your workspace!)</a:t>
             </a:r>
             <a:endParaRPr lang="en-GB" kern="0" dirty="0" smtClean="0"/>
           </a:p>
@@ -5685,11 +5659,7 @@
             <a:pPr defTabSz="914400"/>
             <a:r>
               <a:rPr lang="en-US" kern="0" dirty="0" smtClean="0"/>
-              <a:t>‘</a:t>
-            </a:r>
-            <a:r>
-              <a:rPr lang="en-US" kern="0" dirty="0" smtClean="0"/>
-              <a:t>mean’ is a function that computes the arithmetic mean</a:t>
+              <a:t>‘mean’ is a function that computes the arithmetic mean</a:t>
             </a:r>
             <a:endParaRPr lang="en-GB" kern="0" dirty="0" smtClean="0"/>
           </a:p>
@@ -5708,7 +5678,7 @@
       </p:sp>
       <p:pic>
         <p:nvPicPr>
-          <p:cNvPr id="5" name="Picture 4"/>
+          <p:cNvPr id="4" name="Picture 3"/>
           <p:cNvPicPr>
             <a:picLocks noChangeAspect="1"/>
           </p:cNvPicPr>
@@ -5722,8 +5692,8 @@
         </p:blipFill>
         <p:spPr>
           <a:xfrm>
-            <a:off x="428211" y="1672485"/>
-            <a:ext cx="4713234" cy="2511149"/>
+            <a:off x="523460" y="1737733"/>
+            <a:ext cx="4735243" cy="2020228"/>
           </a:xfrm>
           <a:prstGeom prst="rect">
             <a:avLst/>
@@ -5793,11 +5763,7 @@
             </a:r>
             <a:r>
               <a:rPr lang="en-US" dirty="0" smtClean="0"/>
-              <a:t> </a:t>
-            </a:r>
-            <a:r>
-              <a:rPr lang="en-US" dirty="0" smtClean="0"/>
-              <a:t>data</a:t>
+              <a:t> data</a:t>
             </a:r>
             <a:endParaRPr lang="en-GB" dirty="0"/>
           </a:p>
@@ -6117,11 +6083,7 @@
             <a:pPr defTabSz="914400"/>
             <a:r>
               <a:rPr lang="en-US" kern="0" dirty="0" smtClean="0"/>
-              <a:t>‘</a:t>
-            </a:r>
-            <a:r>
-              <a:rPr lang="en-US" kern="0" dirty="0" smtClean="0"/>
-              <a:t>mean’ is a function that computes the arithmetic mean</a:t>
+              <a:t>‘mean’ is a function that computes the arithmetic mean</a:t>
             </a:r>
             <a:endParaRPr lang="en-GB" kern="0" dirty="0" smtClean="0"/>
           </a:p>

</xml_diff>